<commit_message>
Update slides and regression script
</commit_message>
<xml_diff>
--- a/slides/072820 Lab meeting.pptx
+++ b/slides/072820 Lab meeting.pptx
@@ -5,15 +5,16 @@
     <p:sldMasterId id="2147483648" r:id="rId1"/>
   </p:sldMasterIdLst>
   <p:notesMasterIdLst>
-    <p:notesMasterId r:id="rId8"/>
+    <p:notesMasterId r:id="rId9"/>
   </p:notesMasterIdLst>
   <p:sldIdLst>
-    <p:sldId id="257" r:id="rId2"/>
-    <p:sldId id="258" r:id="rId3"/>
-    <p:sldId id="261" r:id="rId4"/>
-    <p:sldId id="259" r:id="rId5"/>
-    <p:sldId id="260" r:id="rId6"/>
-    <p:sldId id="262" r:id="rId7"/>
+    <p:sldId id="263" r:id="rId2"/>
+    <p:sldId id="257" r:id="rId3"/>
+    <p:sldId id="258" r:id="rId4"/>
+    <p:sldId id="261" r:id="rId5"/>
+    <p:sldId id="259" r:id="rId6"/>
+    <p:sldId id="260" r:id="rId7"/>
+    <p:sldId id="262" r:id="rId8"/>
   </p:sldIdLst>
   <p:sldSz cx="12192000" cy="6858000"/>
   <p:notesSz cx="6858000" cy="9144000"/>
@@ -112,13 +113,18 @@
       </a:defRPr>
     </a:lvl9pPr>
   </p:defaultTextStyle>
+  <p:extLst>
+    <p:ext uri="{EFAFB233-063F-42B5-8137-9DF3F51BA10A}">
+      <p15:sldGuideLst xmlns:p15="http://schemas.microsoft.com/office/powerpoint/2012/main"/>
+    </p:ext>
+  </p:extLst>
 </p:presentation>
 </file>
 
 <file path=ppt/revisionInfo.xml><?xml version="1.0" encoding="utf-8"?>
 <p1510:revInfo xmlns:a="http://schemas.openxmlformats.org/drawingml/2006/main" xmlns:r="http://schemas.openxmlformats.org/officeDocument/2006/relationships" xmlns:p1510="http://schemas.microsoft.com/office/powerpoint/2015/10/main">
   <p1510:revLst>
-    <p1510:client id="{C9E4095A-B81D-40C6-A960-23C387BAA37C}" v="14" dt="2020-07-28T01:04:32.106"/>
+    <p1510:client id="{C9E4095A-B81D-40C6-A960-23C387BAA37C}" v="17" dt="2020-07-28T02:52:44.424"/>
   </p1510:revLst>
 </p1510:revInfo>
 </file>
@@ -127,8 +133,8 @@
 <pc:chgInfo xmlns:a="http://schemas.openxmlformats.org/drawingml/2006/main" xmlns:r="http://schemas.openxmlformats.org/officeDocument/2006/relationships" xmlns:ac="http://schemas.microsoft.com/office/drawing/2013/main/command" xmlns:pc="http://schemas.microsoft.com/office/powerpoint/2013/main/command">
   <pc:docChgLst>
     <pc:chgData name="Troy Biernath" userId="aed3d806ed7068fe" providerId="LiveId" clId="{C9E4095A-B81D-40C6-A960-23C387BAA37C}"/>
-    <pc:docChg chg="custSel mod addSld delSld modSld">
-      <pc:chgData name="Troy Biernath" userId="aed3d806ed7068fe" providerId="LiveId" clId="{C9E4095A-B81D-40C6-A960-23C387BAA37C}" dt="2020-07-28T01:38:00.650" v="865" actId="20577"/>
+    <pc:docChg chg="undo custSel mod addSld delSld modSld sldOrd">
+      <pc:chgData name="Troy Biernath" userId="aed3d806ed7068fe" providerId="LiveId" clId="{C9E4095A-B81D-40C6-A960-23C387BAA37C}" dt="2020-07-28T02:53:15.614" v="1053" actId="14100"/>
       <pc:docMkLst>
         <pc:docMk/>
       </pc:docMkLst>
@@ -140,13 +146,13 @@
         </pc:sldMkLst>
       </pc:sldChg>
       <pc:sldChg chg="modSp new mod">
-        <pc:chgData name="Troy Biernath" userId="aed3d806ed7068fe" providerId="LiveId" clId="{C9E4095A-B81D-40C6-A960-23C387BAA37C}" dt="2020-07-28T01:38:00.650" v="865" actId="20577"/>
+        <pc:chgData name="Troy Biernath" userId="aed3d806ed7068fe" providerId="LiveId" clId="{C9E4095A-B81D-40C6-A960-23C387BAA37C}" dt="2020-07-28T02:52:19.757" v="936" actId="20577"/>
         <pc:sldMkLst>
           <pc:docMk/>
           <pc:sldMk cId="1488078979" sldId="257"/>
         </pc:sldMkLst>
         <pc:spChg chg="mod">
-          <ac:chgData name="Troy Biernath" userId="aed3d806ed7068fe" providerId="LiveId" clId="{C9E4095A-B81D-40C6-A960-23C387BAA37C}" dt="2020-07-27T22:13:31.474" v="220" actId="255"/>
+          <ac:chgData name="Troy Biernath" userId="aed3d806ed7068fe" providerId="LiveId" clId="{C9E4095A-B81D-40C6-A960-23C387BAA37C}" dt="2020-07-28T02:52:19.757" v="936" actId="20577"/>
           <ac:spMkLst>
             <pc:docMk/>
             <pc:sldMk cId="1488078979" sldId="257"/>
@@ -154,7 +160,7 @@
           </ac:spMkLst>
         </pc:spChg>
         <pc:spChg chg="mod">
-          <ac:chgData name="Troy Biernath" userId="aed3d806ed7068fe" providerId="LiveId" clId="{C9E4095A-B81D-40C6-A960-23C387BAA37C}" dt="2020-07-28T01:38:00.650" v="865" actId="20577"/>
+          <ac:chgData name="Troy Biernath" userId="aed3d806ed7068fe" providerId="LiveId" clId="{C9E4095A-B81D-40C6-A960-23C387BAA37C}" dt="2020-07-28T02:14:34.208" v="866"/>
           <ac:spMkLst>
             <pc:docMk/>
             <pc:sldMk cId="1488078979" sldId="257"/>
@@ -396,6 +402,61 @@
             <ac:spMk id="3" creationId="{4FCC796C-5391-497D-8D17-5E5D79EE58C3}"/>
           </ac:spMkLst>
         </pc:spChg>
+      </pc:sldChg>
+      <pc:sldChg chg="addSp delSp modSp new mod ord setBg">
+        <pc:chgData name="Troy Biernath" userId="aed3d806ed7068fe" providerId="LiveId" clId="{C9E4095A-B81D-40C6-A960-23C387BAA37C}" dt="2020-07-28T02:53:15.614" v="1053" actId="14100"/>
+        <pc:sldMkLst>
+          <pc:docMk/>
+          <pc:sldMk cId="712037215" sldId="263"/>
+        </pc:sldMkLst>
+        <pc:spChg chg="mod">
+          <ac:chgData name="Troy Biernath" userId="aed3d806ed7068fe" providerId="LiveId" clId="{C9E4095A-B81D-40C6-A960-23C387BAA37C}" dt="2020-07-28T02:52:26.461" v="938" actId="20577"/>
+          <ac:spMkLst>
+            <pc:docMk/>
+            <pc:sldMk cId="712037215" sldId="263"/>
+            <ac:spMk id="2" creationId="{3EACD587-000A-4D09-B387-6BBE3F518716}"/>
+          </ac:spMkLst>
+        </pc:spChg>
+        <pc:spChg chg="del">
+          <ac:chgData name="Troy Biernath" userId="aed3d806ed7068fe" providerId="LiveId" clId="{C9E4095A-B81D-40C6-A960-23C387BAA37C}" dt="2020-07-28T02:50:36.647" v="868" actId="931"/>
+          <ac:spMkLst>
+            <pc:docMk/>
+            <pc:sldMk cId="712037215" sldId="263"/>
+            <ac:spMk id="3" creationId="{E1712EE3-58C4-41E5-B769-25A3B4775C45}"/>
+          </ac:spMkLst>
+        </pc:spChg>
+        <pc:spChg chg="add mod">
+          <ac:chgData name="Troy Biernath" userId="aed3d806ed7068fe" providerId="LiveId" clId="{C9E4095A-B81D-40C6-A960-23C387BAA37C}" dt="2020-07-28T02:53:15.614" v="1053" actId="14100"/>
+          <ac:spMkLst>
+            <pc:docMk/>
+            <pc:sldMk cId="712037215" sldId="263"/>
+            <ac:spMk id="8" creationId="{6D8666D5-7BA2-4A27-92AB-7EA6F82039C9}"/>
+          </ac:spMkLst>
+        </pc:spChg>
+        <pc:spChg chg="add del">
+          <ac:chgData name="Troy Biernath" userId="aed3d806ed7068fe" providerId="LiveId" clId="{C9E4095A-B81D-40C6-A960-23C387BAA37C}" dt="2020-07-28T02:50:59.716" v="877" actId="26606"/>
+          <ac:spMkLst>
+            <pc:docMk/>
+            <pc:sldMk cId="712037215" sldId="263"/>
+            <ac:spMk id="12" creationId="{022BDE4A-8A20-4A69-9C5A-581C82036A4D}"/>
+          </ac:spMkLst>
+        </pc:spChg>
+        <pc:picChg chg="add mod ord">
+          <ac:chgData name="Troy Biernath" userId="aed3d806ed7068fe" providerId="LiveId" clId="{C9E4095A-B81D-40C6-A960-23C387BAA37C}" dt="2020-07-28T02:52:34.922" v="939" actId="1076"/>
+          <ac:picMkLst>
+            <pc:docMk/>
+            <pc:sldMk cId="712037215" sldId="263"/>
+            <ac:picMk id="5" creationId="{81193CB4-CC2B-4B6B-A397-3A49058BA03E}"/>
+          </ac:picMkLst>
+        </pc:picChg>
+        <pc:picChg chg="add mod">
+          <ac:chgData name="Troy Biernath" userId="aed3d806ed7068fe" providerId="LiveId" clId="{C9E4095A-B81D-40C6-A960-23C387BAA37C}" dt="2020-07-28T02:52:37.843" v="940" actId="1076"/>
+          <ac:picMkLst>
+            <pc:docMk/>
+            <pc:sldMk cId="712037215" sldId="263"/>
+            <ac:picMk id="7" creationId="{9BC8590D-5E95-4383-B83C-01297BD4AE59}"/>
+          </ac:picMkLst>
+        </pc:picChg>
       </pc:sldChg>
     </pc:docChg>
   </pc:docChgLst>
@@ -3970,7 +4031,7 @@
           <p:cNvPr id="2" name="Title 1">
             <a:extLst>
               <a:ext uri="{FF2B5EF4-FFF2-40B4-BE49-F238E27FC236}">
-                <a16:creationId xmlns:a16="http://schemas.microsoft.com/office/drawing/2014/main" id="{A68D3AFF-37BC-4C99-9D74-98B73CE25D24}"/>
+                <a16:creationId xmlns:a16="http://schemas.microsoft.com/office/drawing/2014/main" id="{3EACD587-000A-4D09-B387-6BBE3F518716}"/>
               </a:ext>
             </a:extLst>
           </p:cNvPr>
@@ -3983,66 +4044,122 @@
         </p:nvSpPr>
         <p:spPr/>
         <p:txBody>
-          <a:bodyPr>
-            <a:normAutofit/>
+          <a:bodyPr/>
+          <a:lstStyle/>
+          <a:p>
+            <a:r>
+              <a:rPr lang="en-US" dirty="0" err="1"/>
+              <a:t>OleA</a:t>
+            </a:r>
+            <a:r>
+              <a:rPr lang="en-US" dirty="0"/>
+              <a:t> temperatures</a:t>
+            </a:r>
+          </a:p>
+        </p:txBody>
+      </p:sp>
+      <p:pic>
+        <p:nvPicPr>
+          <p:cNvPr id="5" name="Content Placeholder 4" descr="A screenshot of a cell phone&#10;&#10;Description automatically generated">
+            <a:extLst>
+              <a:ext uri="{FF2B5EF4-FFF2-40B4-BE49-F238E27FC236}">
+                <a16:creationId xmlns:a16="http://schemas.microsoft.com/office/drawing/2014/main" id="{81193CB4-CC2B-4B6B-A397-3A49058BA03E}"/>
+              </a:ext>
+            </a:extLst>
+          </p:cNvPr>
+          <p:cNvPicPr>
+            <a:picLocks noGrp="1" noChangeAspect="1"/>
+          </p:cNvPicPr>
+          <p:nvPr>
+            <p:ph idx="1"/>
+          </p:nvPr>
+        </p:nvPicPr>
+        <p:blipFill>
+          <a:blip r:embed="rId2">
+            <a:extLst>
+              <a:ext uri="{28A0092B-C50C-407E-A947-70E740481C1C}">
+                <a14:useLocalDpi xmlns:a14="http://schemas.microsoft.com/office/drawing/2010/main" val="0"/>
+              </a:ext>
+            </a:extLst>
+          </a:blip>
+          <a:stretch>
+            <a:fillRect/>
+          </a:stretch>
+        </p:blipFill>
+        <p:spPr>
+          <a:xfrm>
+            <a:off x="233364" y="2818009"/>
+            <a:ext cx="5729307" cy="3269377"/>
+          </a:xfrm>
+        </p:spPr>
+      </p:pic>
+      <p:pic>
+        <p:nvPicPr>
+          <p:cNvPr id="7" name="Picture 6" descr="A picture containing drawing&#10;&#10;Description automatically generated">
+            <a:extLst>
+              <a:ext uri="{FF2B5EF4-FFF2-40B4-BE49-F238E27FC236}">
+                <a16:creationId xmlns:a16="http://schemas.microsoft.com/office/drawing/2014/main" id="{9BC8590D-5E95-4383-B83C-01297BD4AE59}"/>
+              </a:ext>
+            </a:extLst>
+          </p:cNvPr>
+          <p:cNvPicPr>
+            <a:picLocks noChangeAspect="1"/>
+          </p:cNvPicPr>
+          <p:nvPr/>
+        </p:nvPicPr>
+        <p:blipFill>
+          <a:blip r:embed="rId3">
+            <a:extLst>
+              <a:ext uri="{28A0092B-C50C-407E-A947-70E740481C1C}">
+                <a14:useLocalDpi xmlns:a14="http://schemas.microsoft.com/office/drawing/2010/main" val="0"/>
+              </a:ext>
+            </a:extLst>
+          </a:blip>
+          <a:stretch>
+            <a:fillRect/>
+          </a:stretch>
+        </p:blipFill>
+        <p:spPr>
+          <a:xfrm>
+            <a:off x="6229331" y="2827608"/>
+            <a:ext cx="5729307" cy="3259778"/>
+          </a:xfrm>
+          <a:prstGeom prst="rect">
+            <a:avLst/>
+          </a:prstGeom>
+        </p:spPr>
+      </p:pic>
+      <p:sp>
+        <p:nvSpPr>
+          <p:cNvPr id="8" name="TextBox 7">
+            <a:extLst>
+              <a:ext uri="{FF2B5EF4-FFF2-40B4-BE49-F238E27FC236}">
+                <a16:creationId xmlns:a16="http://schemas.microsoft.com/office/drawing/2014/main" id="{6D8666D5-7BA2-4A27-92AB-7EA6F82039C9}"/>
+              </a:ext>
+            </a:extLst>
+          </p:cNvPr>
+          <p:cNvSpPr txBox="1"/>
+          <p:nvPr/>
+        </p:nvSpPr>
+        <p:spPr>
+          <a:xfrm>
+            <a:off x="838199" y="1895475"/>
+            <a:ext cx="8391525" cy="369332"/>
+          </a:xfrm>
+          <a:prstGeom prst="rect">
+            <a:avLst/>
+          </a:prstGeom>
+          <a:noFill/>
+        </p:spPr>
+        <p:txBody>
+          <a:bodyPr wrap="square" rtlCol="0">
+            <a:spAutoFit/>
           </a:bodyPr>
           <a:lstStyle/>
           <a:p>
             <a:r>
-              <a:rPr lang="en-US" sz="3800" dirty="0"/>
-              <a:t>Machine learning with </a:t>
-            </a:r>
-            <a:r>
-              <a:rPr lang="en-US" sz="3800" dirty="0" err="1"/>
-              <a:t>OleA</a:t>
-            </a:r>
-            <a:r>
-              <a:rPr lang="en-US" sz="3800" dirty="0"/>
-              <a:t> temperature adaptation</a:t>
-            </a:r>
-          </a:p>
-        </p:txBody>
-      </p:sp>
-      <p:sp>
-        <p:nvSpPr>
-          <p:cNvPr id="3" name="Content Placeholder 2">
-            <a:extLst>
-              <a:ext uri="{FF2B5EF4-FFF2-40B4-BE49-F238E27FC236}">
-                <a16:creationId xmlns:a16="http://schemas.microsoft.com/office/drawing/2014/main" id="{2316E7D1-8141-4ED9-9314-FD46A92C49CB}"/>
-              </a:ext>
-            </a:extLst>
-          </p:cNvPr>
-          <p:cNvSpPr>
-            <a:spLocks noGrp="1"/>
-          </p:cNvSpPr>
-          <p:nvPr>
-            <p:ph idx="1"/>
-          </p:nvPr>
-        </p:nvSpPr>
-        <p:spPr/>
-        <p:txBody>
-          <a:bodyPr/>
-          <a:lstStyle/>
-          <a:p>
-            <a:pPr>
-              <a:lnSpc>
-                <a:spcPct val="200000"/>
-              </a:lnSpc>
-            </a:pPr>
-            <a:r>
               <a:rPr lang="en-US" dirty="0"/>
-              <a:t>Goal: Identify patterns that may signal temperature adaptation</a:t>
-            </a:r>
-          </a:p>
-          <a:p>
-            <a:pPr>
-              <a:lnSpc>
-                <a:spcPct val="100000"/>
-              </a:lnSpc>
-            </a:pPr>
-            <a:r>
-              <a:rPr lang="en-US" dirty="0"/>
-              <a:t>Dataset: combination of 30 TARA sequences, 73 </a:t>
+              <a:t>123 </a:t>
             </a:r>
             <a:r>
               <a:rPr lang="en-US" dirty="0" err="1"/>
@@ -4050,23 +4167,15 @@
             </a:r>
             <a:r>
               <a:rPr lang="en-US" dirty="0"/>
-              <a:t> from previous studies, and 20 interesting psychrophiles </a:t>
-            </a:r>
-            <a:r>
-              <a:rPr lang="en-US"/>
-              <a:t>and thermophiles</a:t>
-            </a:r>
-            <a:endParaRPr lang="en-US" dirty="0"/>
-          </a:p>
-          <a:p>
-            <a:endParaRPr lang="en-US" dirty="0"/>
+              <a:t> from organisms with diverse optimal growth temperatures</a:t>
+            </a:r>
           </a:p>
         </p:txBody>
       </p:sp>
     </p:spTree>
     <p:extLst>
       <p:ext uri="{BB962C8B-B14F-4D97-AF65-F5344CB8AC3E}">
-        <p14:creationId xmlns:p14="http://schemas.microsoft.com/office/powerpoint/2010/main" val="1488078979"/>
+        <p14:creationId xmlns:p14="http://schemas.microsoft.com/office/powerpoint/2010/main" val="712037215"/>
       </p:ext>
     </p:extLst>
   </p:cSld>
@@ -4098,7 +4207,7 @@
           <p:cNvPr id="2" name="Title 1">
             <a:extLst>
               <a:ext uri="{FF2B5EF4-FFF2-40B4-BE49-F238E27FC236}">
-                <a16:creationId xmlns:a16="http://schemas.microsoft.com/office/drawing/2014/main" id="{56428158-D7AB-4A2A-B2DD-3921CFE61C2A}"/>
+                <a16:creationId xmlns:a16="http://schemas.microsoft.com/office/drawing/2014/main" id="{A68D3AFF-37BC-4C99-9D74-98B73CE25D24}"/>
               </a:ext>
             </a:extLst>
           </p:cNvPr>
@@ -4111,128 +4220,124 @@
         </p:nvSpPr>
         <p:spPr/>
         <p:txBody>
+          <a:bodyPr>
+            <a:normAutofit/>
+          </a:bodyPr>
+          <a:lstStyle/>
+          <a:p>
+            <a:r>
+              <a:rPr lang="en-US" sz="3800" dirty="0"/>
+              <a:t>Machine learning with </a:t>
+            </a:r>
+            <a:r>
+              <a:rPr lang="en-US" sz="3800" dirty="0" err="1"/>
+              <a:t>OleA</a:t>
+            </a:r>
+            <a:r>
+              <a:rPr lang="en-US" sz="3800" dirty="0"/>
+              <a:t> temperature adaptation</a:t>
+            </a:r>
+          </a:p>
+        </p:txBody>
+      </p:sp>
+      <p:sp>
+        <p:nvSpPr>
+          <p:cNvPr id="3" name="Content Placeholder 2">
+            <a:extLst>
+              <a:ext uri="{FF2B5EF4-FFF2-40B4-BE49-F238E27FC236}">
+                <a16:creationId xmlns:a16="http://schemas.microsoft.com/office/drawing/2014/main" id="{2316E7D1-8141-4ED9-9314-FD46A92C49CB}"/>
+              </a:ext>
+            </a:extLst>
+          </p:cNvPr>
+          <p:cNvSpPr>
+            <a:spLocks noGrp="1"/>
+          </p:cNvSpPr>
+          <p:nvPr>
+            <p:ph idx="1"/>
+          </p:nvPr>
+        </p:nvSpPr>
+        <p:spPr/>
+        <p:txBody>
           <a:bodyPr/>
           <a:lstStyle/>
           <a:p>
+            <a:pPr>
+              <a:lnSpc>
+                <a:spcPct val="200000"/>
+              </a:lnSpc>
+            </a:pPr>
+            <a:r>
+              <a:rPr lang="en-US" b="1" dirty="0"/>
+              <a:t>Goal: </a:t>
+            </a:r>
             <a:r>
               <a:rPr lang="en-US" dirty="0"/>
-              <a:t>Regression</a:t>
-            </a:r>
-          </a:p>
-        </p:txBody>
-      </p:sp>
-      <p:pic>
-        <p:nvPicPr>
-          <p:cNvPr id="5" name="Content Placeholder 4" descr="A screenshot of a cell phone&#10;&#10;Description automatically generated">
-            <a:extLst>
-              <a:ext uri="{FF2B5EF4-FFF2-40B4-BE49-F238E27FC236}">
-                <a16:creationId xmlns:a16="http://schemas.microsoft.com/office/drawing/2014/main" id="{C97D4B54-72BD-4C1F-87B9-1BAA62504468}"/>
-              </a:ext>
-            </a:extLst>
-          </p:cNvPr>
-          <p:cNvPicPr>
-            <a:picLocks noGrp="1" noChangeAspect="1"/>
-          </p:cNvPicPr>
-          <p:nvPr>
-            <p:ph idx="1"/>
-          </p:nvPr>
-        </p:nvPicPr>
-        <p:blipFill>
-          <a:blip r:embed="rId2">
-            <a:extLst>
-              <a:ext uri="{28A0092B-C50C-407E-A947-70E740481C1C}">
-                <a14:useLocalDpi xmlns:a14="http://schemas.microsoft.com/office/drawing/2010/main" val="0"/>
-              </a:ext>
-            </a:extLst>
-          </a:blip>
-          <a:stretch>
-            <a:fillRect/>
-          </a:stretch>
-        </p:blipFill>
-        <p:spPr>
-          <a:xfrm>
-            <a:off x="838200" y="2368680"/>
-            <a:ext cx="10169382" cy="2373141"/>
-          </a:xfrm>
-        </p:spPr>
-      </p:pic>
-      <p:sp>
-        <p:nvSpPr>
-          <p:cNvPr id="6" name="Arrow: Right 5">
-            <a:extLst>
-              <a:ext uri="{FF2B5EF4-FFF2-40B4-BE49-F238E27FC236}">
-                <a16:creationId xmlns:a16="http://schemas.microsoft.com/office/drawing/2014/main" id="{14EB0E80-01C6-4299-84B2-2FB9A81AE520}"/>
-              </a:ext>
-            </a:extLst>
-          </p:cNvPr>
-          <p:cNvSpPr/>
-          <p:nvPr/>
-        </p:nvSpPr>
-        <p:spPr>
-          <a:xfrm>
-            <a:off x="211664" y="4533099"/>
-            <a:ext cx="516307" cy="208722"/>
-          </a:xfrm>
-          <a:prstGeom prst="rightArrow">
-            <a:avLst/>
-          </a:prstGeom>
-        </p:spPr>
-        <p:style>
-          <a:lnRef idx="2">
-            <a:schemeClr val="accent6">
-              <a:shade val="50000"/>
-            </a:schemeClr>
-          </a:lnRef>
-          <a:fillRef idx="1">
-            <a:schemeClr val="accent6"/>
-          </a:fillRef>
-          <a:effectRef idx="0">
-            <a:schemeClr val="accent6"/>
-          </a:effectRef>
-          <a:fontRef idx="minor">
-            <a:schemeClr val="lt1"/>
-          </a:fontRef>
-        </p:style>
-        <p:txBody>
-          <a:bodyPr rtlCol="0" anchor="ctr"/>
-          <a:lstStyle/>
-          <a:p>
-            <a:pPr algn="ctr"/>
-            <a:endParaRPr lang="en-US"/>
-          </a:p>
-        </p:txBody>
-      </p:sp>
-      <p:sp>
-        <p:nvSpPr>
-          <p:cNvPr id="7" name="TextBox 6">
-            <a:extLst>
-              <a:ext uri="{FF2B5EF4-FFF2-40B4-BE49-F238E27FC236}">
-                <a16:creationId xmlns:a16="http://schemas.microsoft.com/office/drawing/2014/main" id="{319FDF8D-FCDE-48EE-9F08-C46990E61097}"/>
-              </a:ext>
-            </a:extLst>
-          </p:cNvPr>
-          <p:cNvSpPr txBox="1"/>
-          <p:nvPr/>
-        </p:nvSpPr>
-        <p:spPr>
-          <a:xfrm>
-            <a:off x="727971" y="1690688"/>
-            <a:ext cx="5555974" cy="369332"/>
-          </a:xfrm>
-          <a:prstGeom prst="rect">
-            <a:avLst/>
-          </a:prstGeom>
-          <a:noFill/>
-        </p:spPr>
-        <p:txBody>
-          <a:bodyPr wrap="square" rtlCol="0">
-            <a:spAutoFit/>
-          </a:bodyPr>
-          <a:lstStyle/>
-          <a:p>
+              <a:t>Identify sequence signatures of </a:t>
+            </a:r>
+            <a:r>
+              <a:rPr lang="en-US" dirty="0" err="1"/>
+              <a:t>OleA</a:t>
+            </a:r>
             <a:r>
               <a:rPr lang="en-US" dirty="0"/>
-              <a:t>Which feature set gives the best prediction?</a:t>
+              <a:t> temperature preference</a:t>
+            </a:r>
+          </a:p>
+          <a:p>
+            <a:pPr>
+              <a:lnSpc>
+                <a:spcPct val="100000"/>
+              </a:lnSpc>
+            </a:pPr>
+            <a:r>
+              <a:rPr lang="en-US" b="1" dirty="0"/>
+              <a:t>Dataset: </a:t>
+            </a:r>
+            <a:r>
+              <a:rPr lang="en-US" dirty="0"/>
+              <a:t>combination of 30 TARA sequences, 73 </a:t>
+            </a:r>
+            <a:r>
+              <a:rPr lang="en-US" dirty="0" err="1"/>
+              <a:t>OleAs</a:t>
+            </a:r>
+            <a:r>
+              <a:rPr lang="en-US" dirty="0"/>
+              <a:t> from previous studies, and 20 interesting psychrophiles and thermophiles</a:t>
+            </a:r>
+          </a:p>
+          <a:p>
+            <a:pPr>
+              <a:lnSpc>
+                <a:spcPct val="100000"/>
+              </a:lnSpc>
+            </a:pPr>
+            <a:r>
+              <a:rPr lang="en-US" b="1" dirty="0"/>
+              <a:t>Prediction: </a:t>
+            </a:r>
+            <a:r>
+              <a:rPr lang="en-US" dirty="0"/>
+              <a:t>optimal growth temperatures (from literature)</a:t>
+            </a:r>
+          </a:p>
+          <a:p>
+            <a:pPr>
+              <a:lnSpc>
+                <a:spcPct val="100000"/>
+              </a:lnSpc>
+            </a:pPr>
+            <a:r>
+              <a:rPr lang="en-US" b="1" dirty="0"/>
+              <a:t>Predictors: </a:t>
+            </a:r>
+            <a:r>
+              <a:rPr lang="en-US" dirty="0" err="1"/>
+              <a:t>OleA</a:t>
+            </a:r>
+            <a:r>
+              <a:rPr lang="en-US" dirty="0"/>
+              <a:t> sequence features</a:t>
             </a:r>
           </a:p>
         </p:txBody>
@@ -4240,7 +4345,7 @@
     </p:spTree>
     <p:extLst>
       <p:ext uri="{BB962C8B-B14F-4D97-AF65-F5344CB8AC3E}">
-        <p14:creationId xmlns:p14="http://schemas.microsoft.com/office/powerpoint/2010/main" val="1907406568"/>
+        <p14:creationId xmlns:p14="http://schemas.microsoft.com/office/powerpoint/2010/main" val="1488078979"/>
       </p:ext>
     </p:extLst>
   </p:cSld>
@@ -4272,6 +4377,180 @@
           <p:cNvPr id="2" name="Title 1">
             <a:extLst>
               <a:ext uri="{FF2B5EF4-FFF2-40B4-BE49-F238E27FC236}">
+                <a16:creationId xmlns:a16="http://schemas.microsoft.com/office/drawing/2014/main" id="{56428158-D7AB-4A2A-B2DD-3921CFE61C2A}"/>
+              </a:ext>
+            </a:extLst>
+          </p:cNvPr>
+          <p:cNvSpPr>
+            <a:spLocks noGrp="1"/>
+          </p:cNvSpPr>
+          <p:nvPr>
+            <p:ph type="title"/>
+          </p:nvPr>
+        </p:nvSpPr>
+        <p:spPr/>
+        <p:txBody>
+          <a:bodyPr/>
+          <a:lstStyle/>
+          <a:p>
+            <a:r>
+              <a:rPr lang="en-US" dirty="0"/>
+              <a:t>Regression</a:t>
+            </a:r>
+          </a:p>
+        </p:txBody>
+      </p:sp>
+      <p:pic>
+        <p:nvPicPr>
+          <p:cNvPr id="5" name="Content Placeholder 4" descr="A screenshot of a cell phone&#10;&#10;Description automatically generated">
+            <a:extLst>
+              <a:ext uri="{FF2B5EF4-FFF2-40B4-BE49-F238E27FC236}">
+                <a16:creationId xmlns:a16="http://schemas.microsoft.com/office/drawing/2014/main" id="{C97D4B54-72BD-4C1F-87B9-1BAA62504468}"/>
+              </a:ext>
+            </a:extLst>
+          </p:cNvPr>
+          <p:cNvPicPr>
+            <a:picLocks noGrp="1" noChangeAspect="1"/>
+          </p:cNvPicPr>
+          <p:nvPr>
+            <p:ph idx="1"/>
+          </p:nvPr>
+        </p:nvPicPr>
+        <p:blipFill>
+          <a:blip r:embed="rId2">
+            <a:extLst>
+              <a:ext uri="{28A0092B-C50C-407E-A947-70E740481C1C}">
+                <a14:useLocalDpi xmlns:a14="http://schemas.microsoft.com/office/drawing/2010/main" val="0"/>
+              </a:ext>
+            </a:extLst>
+          </a:blip>
+          <a:stretch>
+            <a:fillRect/>
+          </a:stretch>
+        </p:blipFill>
+        <p:spPr>
+          <a:xfrm>
+            <a:off x="838200" y="2368680"/>
+            <a:ext cx="10169382" cy="2373141"/>
+          </a:xfrm>
+        </p:spPr>
+      </p:pic>
+      <p:sp>
+        <p:nvSpPr>
+          <p:cNvPr id="6" name="Arrow: Right 5">
+            <a:extLst>
+              <a:ext uri="{FF2B5EF4-FFF2-40B4-BE49-F238E27FC236}">
+                <a16:creationId xmlns:a16="http://schemas.microsoft.com/office/drawing/2014/main" id="{14EB0E80-01C6-4299-84B2-2FB9A81AE520}"/>
+              </a:ext>
+            </a:extLst>
+          </p:cNvPr>
+          <p:cNvSpPr/>
+          <p:nvPr/>
+        </p:nvSpPr>
+        <p:spPr>
+          <a:xfrm>
+            <a:off x="211664" y="4533099"/>
+            <a:ext cx="516307" cy="208722"/>
+          </a:xfrm>
+          <a:prstGeom prst="rightArrow">
+            <a:avLst/>
+          </a:prstGeom>
+        </p:spPr>
+        <p:style>
+          <a:lnRef idx="2">
+            <a:schemeClr val="accent6">
+              <a:shade val="50000"/>
+            </a:schemeClr>
+          </a:lnRef>
+          <a:fillRef idx="1">
+            <a:schemeClr val="accent6"/>
+          </a:fillRef>
+          <a:effectRef idx="0">
+            <a:schemeClr val="accent6"/>
+          </a:effectRef>
+          <a:fontRef idx="minor">
+            <a:schemeClr val="lt1"/>
+          </a:fontRef>
+        </p:style>
+        <p:txBody>
+          <a:bodyPr rtlCol="0" anchor="ctr"/>
+          <a:lstStyle/>
+          <a:p>
+            <a:pPr algn="ctr"/>
+            <a:endParaRPr lang="en-US"/>
+          </a:p>
+        </p:txBody>
+      </p:sp>
+      <p:sp>
+        <p:nvSpPr>
+          <p:cNvPr id="7" name="TextBox 6">
+            <a:extLst>
+              <a:ext uri="{FF2B5EF4-FFF2-40B4-BE49-F238E27FC236}">
+                <a16:creationId xmlns:a16="http://schemas.microsoft.com/office/drawing/2014/main" id="{319FDF8D-FCDE-48EE-9F08-C46990E61097}"/>
+              </a:ext>
+            </a:extLst>
+          </p:cNvPr>
+          <p:cNvSpPr txBox="1"/>
+          <p:nvPr/>
+        </p:nvSpPr>
+        <p:spPr>
+          <a:xfrm>
+            <a:off x="727971" y="1690688"/>
+            <a:ext cx="5555974" cy="369332"/>
+          </a:xfrm>
+          <a:prstGeom prst="rect">
+            <a:avLst/>
+          </a:prstGeom>
+          <a:noFill/>
+        </p:spPr>
+        <p:txBody>
+          <a:bodyPr wrap="square" rtlCol="0">
+            <a:spAutoFit/>
+          </a:bodyPr>
+          <a:lstStyle/>
+          <a:p>
+            <a:r>
+              <a:rPr lang="en-US" dirty="0"/>
+              <a:t>Which feature set gives the best prediction?</a:t>
+            </a:r>
+          </a:p>
+        </p:txBody>
+      </p:sp>
+    </p:spTree>
+    <p:extLst>
+      <p:ext uri="{BB962C8B-B14F-4D97-AF65-F5344CB8AC3E}">
+        <p14:creationId xmlns:p14="http://schemas.microsoft.com/office/powerpoint/2010/main" val="1907406568"/>
+      </p:ext>
+    </p:extLst>
+  </p:cSld>
+  <p:clrMapOvr>
+    <a:masterClrMapping/>
+  </p:clrMapOvr>
+</p:sld>
+</file>
+
+<file path=ppt/slides/slide4.xml><?xml version="1.0" encoding="utf-8"?>
+<p:sld xmlns:a="http://schemas.openxmlformats.org/drawingml/2006/main" xmlns:r="http://schemas.openxmlformats.org/officeDocument/2006/relationships" xmlns:p="http://schemas.openxmlformats.org/presentationml/2006/main">
+  <p:cSld>
+    <p:spTree>
+      <p:nvGrpSpPr>
+        <p:cNvPr id="1" name=""/>
+        <p:cNvGrpSpPr/>
+        <p:nvPr/>
+      </p:nvGrpSpPr>
+      <p:grpSpPr>
+        <a:xfrm>
+          <a:off x="0" y="0"/>
+          <a:ext cx="0" cy="0"/>
+          <a:chOff x="0" y="0"/>
+          <a:chExt cx="0" cy="0"/>
+        </a:xfrm>
+      </p:grpSpPr>
+      <p:sp>
+        <p:nvSpPr>
+          <p:cNvPr id="2" name="Title 1">
+            <a:extLst>
+              <a:ext uri="{FF2B5EF4-FFF2-40B4-BE49-F238E27FC236}">
                 <a16:creationId xmlns:a16="http://schemas.microsoft.com/office/drawing/2014/main" id="{14A77E38-61CB-49E5-8AA4-FF9672964302}"/>
               </a:ext>
             </a:extLst>
@@ -4343,7 +4622,7 @@
 </p:sld>
 </file>
 
-<file path=ppt/slides/slide4.xml><?xml version="1.0" encoding="utf-8"?>
+<file path=ppt/slides/slide5.xml><?xml version="1.0" encoding="utf-8"?>
 <p:sld xmlns:a="http://schemas.openxmlformats.org/drawingml/2006/main" xmlns:r="http://schemas.openxmlformats.org/officeDocument/2006/relationships" xmlns:p="http://schemas.openxmlformats.org/presentationml/2006/main">
   <p:cSld>
     <p:bg>
@@ -4567,7 +4846,7 @@
 </p:sld>
 </file>
 
-<file path=ppt/slides/slide5.xml><?xml version="1.0" encoding="utf-8"?>
+<file path=ppt/slides/slide6.xml><?xml version="1.0" encoding="utf-8"?>
 <p:sld xmlns:a="http://schemas.openxmlformats.org/drawingml/2006/main" xmlns:r="http://schemas.openxmlformats.org/officeDocument/2006/relationships" xmlns:p="http://schemas.openxmlformats.org/presentationml/2006/main">
   <p:cSld>
     <p:spTree>
@@ -4838,7 +5117,7 @@
 </p:sld>
 </file>
 
-<file path=ppt/slides/slide6.xml><?xml version="1.0" encoding="utf-8"?>
+<file path=ppt/slides/slide7.xml><?xml version="1.0" encoding="utf-8"?>
 <p:sld xmlns:a="http://schemas.openxmlformats.org/drawingml/2006/main" xmlns:r="http://schemas.openxmlformats.org/officeDocument/2006/relationships" xmlns:p="http://schemas.openxmlformats.org/presentationml/2006/main">
   <p:cSld>
     <p:spTree>

</xml_diff>